<commit_message>
Updated the status update.
</commit_message>
<xml_diff>
--- a/presentations/20230124_firebird_microburst_durations.pptx
+++ b/presentations/20230124_firebird_microburst_durations.pptx
@@ -5,11 +5,14 @@
     <p:sldMasterId id="2147483648" r:id="rId1"/>
   </p:sldMasterIdLst>
   <p:notesMasterIdLst>
-    <p:notesMasterId r:id="rId4"/>
+    <p:notesMasterId r:id="rId7"/>
   </p:notesMasterIdLst>
   <p:sldIdLst>
     <p:sldId id="256" r:id="rId2"/>
     <p:sldId id="257" r:id="rId3"/>
+    <p:sldId id="258" r:id="rId4"/>
+    <p:sldId id="260" r:id="rId5"/>
+    <p:sldId id="259" r:id="rId6"/>
   </p:sldIdLst>
   <p:sldSz cx="12192000" cy="6858000"/>
   <p:notesSz cx="6858000" cy="9144000"/>
@@ -3968,7 +3971,7 @@
         <p:spPr>
           <a:xfrm>
             <a:off x="272374" y="2276272"/>
-            <a:ext cx="5590162" cy="2031325"/>
+            <a:ext cx="5590162" cy="3970318"/>
           </a:xfrm>
           <a:prstGeom prst="rect">
             <a:avLst/>
@@ -4020,10 +4023,86 @@
               <a:t>Initial microburst width guess is 100 </a:t>
             </a:r>
             <a:r>
-              <a:rPr lang="en-US"/>
+              <a:rPr lang="en-US" dirty="0" err="1"/>
               <a:t>ms.</a:t>
             </a:r>
             <a:endParaRPr lang="en-US" dirty="0"/>
+          </a:p>
+          <a:p>
+            <a:pPr marL="285750" indent="-285750">
+              <a:buFont typeface="Arial" panose="020B0604020202020204" pitchFamily="34" charset="0"/>
+              <a:buChar char="•"/>
+            </a:pPr>
+            <a:r>
+              <a:rPr lang="en-US" dirty="0"/>
+              <a:t>1768 microbursts fit (fit converged)</a:t>
+            </a:r>
+          </a:p>
+          <a:p>
+            <a:pPr marL="285750" indent="-285750">
+              <a:buFont typeface="Arial" panose="020B0604020202020204" pitchFamily="34" charset="0"/>
+              <a:buChar char="•"/>
+            </a:pPr>
+            <a:r>
+              <a:rPr lang="en-US" dirty="0"/>
+              <a:t>6446 microbursts were not fit because</a:t>
+            </a:r>
+          </a:p>
+          <a:p>
+            <a:pPr marL="742950" lvl="1" indent="-285750">
+              <a:buFont typeface="Arial" panose="020B0604020202020204" pitchFamily="34" charset="0"/>
+              <a:buChar char="•"/>
+            </a:pPr>
+            <a:r>
+              <a:rPr lang="en-US" dirty="0"/>
+              <a:t>The </a:t>
+            </a:r>
+            <a:r>
+              <a:rPr lang="en-US" dirty="0" err="1"/>
+              <a:t>HiRes</a:t>
+            </a:r>
+            <a:r>
+              <a:rPr lang="en-US" dirty="0"/>
+              <a:t> cadence was 50 </a:t>
+            </a:r>
+            <a:r>
+              <a:rPr lang="en-US" dirty="0" err="1"/>
+              <a:t>ms</a:t>
+            </a:r>
+            <a:r>
+              <a:rPr lang="en-US" dirty="0"/>
+              <a:t>, or</a:t>
+            </a:r>
+          </a:p>
+          <a:p>
+            <a:pPr marL="742950" lvl="1" indent="-285750">
+              <a:buFont typeface="Arial" panose="020B0604020202020204" pitchFamily="34" charset="0"/>
+              <a:buChar char="•"/>
+            </a:pPr>
+            <a:r>
+              <a:rPr lang="en-US" dirty="0"/>
+              <a:t>The fit did not converge</a:t>
+            </a:r>
+          </a:p>
+          <a:p>
+            <a:pPr marL="742950" lvl="1" indent="-285750">
+              <a:buFont typeface="Arial" panose="020B0604020202020204" pitchFamily="34" charset="0"/>
+              <a:buChar char="•"/>
+            </a:pPr>
+            <a:r>
+              <a:rPr lang="en-US" dirty="0"/>
+              <a:t>(I did not track the category)</a:t>
+            </a:r>
+          </a:p>
+          <a:p>
+            <a:pPr marL="285750" indent="-285750">
+              <a:buFont typeface="Arial" panose="020B0604020202020204" pitchFamily="34" charset="0"/>
+              <a:buChar char="•"/>
+            </a:pPr>
+            <a:r>
+              <a:rPr lang="en-US" dirty="0"/>
+              <a:t>Used only microbursts with adjusted R^2 &gt; 0.9 for the distribution.</a:t>
+            </a:r>
           </a:p>
           <a:p>
             <a:pPr marL="285750" indent="-285750">
@@ -4038,6 +4117,493 @@
     <p:extLst>
       <p:ext uri="{BB962C8B-B14F-4D97-AF65-F5344CB8AC3E}">
         <p14:creationId xmlns:p14="http://schemas.microsoft.com/office/powerpoint/2010/main" val="3427387256"/>
+      </p:ext>
+    </p:extLst>
+  </p:cSld>
+  <p:clrMapOvr>
+    <a:masterClrMapping/>
+  </p:clrMapOvr>
+</p:sld>
+</file>
+
+<file path=ppt/slides/slide3.xml><?xml version="1.0" encoding="utf-8"?>
+<p:sld xmlns:a="http://schemas.openxmlformats.org/drawingml/2006/main" xmlns:r="http://schemas.openxmlformats.org/officeDocument/2006/relationships" xmlns:p="http://schemas.openxmlformats.org/presentationml/2006/main">
+  <p:cSld>
+    <p:spTree>
+      <p:nvGrpSpPr>
+        <p:cNvPr id="1" name=""/>
+        <p:cNvGrpSpPr/>
+        <p:nvPr/>
+      </p:nvGrpSpPr>
+      <p:grpSpPr>
+        <a:xfrm>
+          <a:off x="0" y="0"/>
+          <a:ext cx="0" cy="0"/>
+          <a:chOff x="0" y="0"/>
+          <a:chExt cx="0" cy="0"/>
+        </a:xfrm>
+      </p:grpSpPr>
+      <p:sp>
+        <p:nvSpPr>
+          <p:cNvPr id="2" name="Title 1">
+            <a:extLst>
+              <a:ext uri="{FF2B5EF4-FFF2-40B4-BE49-F238E27FC236}">
+                <a16:creationId xmlns:a16="http://schemas.microsoft.com/office/drawing/2014/main" id="{8F8F60A9-43C8-3FF4-2D7A-4686A7770D2A}"/>
+              </a:ext>
+            </a:extLst>
+          </p:cNvPr>
+          <p:cNvSpPr>
+            <a:spLocks noGrp="1"/>
+          </p:cNvSpPr>
+          <p:nvPr>
+            <p:ph type="title"/>
+          </p:nvPr>
+        </p:nvSpPr>
+        <p:spPr/>
+        <p:txBody>
+          <a:bodyPr/>
+          <a:lstStyle/>
+          <a:p>
+            <a:r>
+              <a:rPr lang="en-US" dirty="0"/>
+              <a:t>Example fits</a:t>
+            </a:r>
+          </a:p>
+        </p:txBody>
+      </p:sp>
+      <p:sp>
+        <p:nvSpPr>
+          <p:cNvPr id="3" name="Content Placeholder 2">
+            <a:extLst>
+              <a:ext uri="{FF2B5EF4-FFF2-40B4-BE49-F238E27FC236}">
+                <a16:creationId xmlns:a16="http://schemas.microsoft.com/office/drawing/2014/main" id="{853B1A66-46DE-41A2-AAFD-0C677EE75060}"/>
+              </a:ext>
+            </a:extLst>
+          </p:cNvPr>
+          <p:cNvSpPr>
+            <a:spLocks noGrp="1"/>
+          </p:cNvSpPr>
+          <p:nvPr>
+            <p:ph idx="1"/>
+          </p:nvPr>
+        </p:nvSpPr>
+        <p:spPr/>
+        <p:txBody>
+          <a:bodyPr/>
+          <a:lstStyle/>
+          <a:p>
+            <a:endParaRPr lang="en-US"/>
+          </a:p>
+        </p:txBody>
+      </p:sp>
+      <p:sp>
+        <p:nvSpPr>
+          <p:cNvPr id="4" name="Date Placeholder 3">
+            <a:extLst>
+              <a:ext uri="{FF2B5EF4-FFF2-40B4-BE49-F238E27FC236}">
+                <a16:creationId xmlns:a16="http://schemas.microsoft.com/office/drawing/2014/main" id="{BD957D0C-8A5C-2495-304D-88659CBEEC9C}"/>
+              </a:ext>
+            </a:extLst>
+          </p:cNvPr>
+          <p:cNvSpPr>
+            <a:spLocks noGrp="1"/>
+          </p:cNvSpPr>
+          <p:nvPr>
+            <p:ph type="dt" sz="half" idx="10"/>
+          </p:nvPr>
+        </p:nvSpPr>
+        <p:spPr/>
+        <p:txBody>
+          <a:bodyPr/>
+          <a:lstStyle/>
+          <a:p>
+            <a:fld id="{A9AE0B51-B8FF-42DE-A3A4-DF64D042A72E}" type="datetime1">
+              <a:rPr lang="en-US" smtClean="0"/>
+              <a:t>1/24/2023</a:t>
+            </a:fld>
+            <a:endParaRPr lang="en-US"/>
+          </a:p>
+        </p:txBody>
+      </p:sp>
+      <p:sp>
+        <p:nvSpPr>
+          <p:cNvPr id="5" name="Slide Number Placeholder 4">
+            <a:extLst>
+              <a:ext uri="{FF2B5EF4-FFF2-40B4-BE49-F238E27FC236}">
+                <a16:creationId xmlns:a16="http://schemas.microsoft.com/office/drawing/2014/main" id="{79C5AEF3-2789-39DB-D3AE-9BFA0381D78E}"/>
+              </a:ext>
+            </a:extLst>
+          </p:cNvPr>
+          <p:cNvSpPr>
+            <a:spLocks noGrp="1"/>
+          </p:cNvSpPr>
+          <p:nvPr>
+            <p:ph type="sldNum" sz="quarter" idx="12"/>
+          </p:nvPr>
+        </p:nvSpPr>
+        <p:spPr/>
+        <p:txBody>
+          <a:bodyPr/>
+          <a:lstStyle/>
+          <a:p>
+            <a:fld id="{806C93F5-D892-47E2-990F-7040AF29FE32}" type="slidenum">
+              <a:rPr lang="en-US" smtClean="0"/>
+              <a:t>3</a:t>
+            </a:fld>
+            <a:endParaRPr lang="en-US"/>
+          </a:p>
+        </p:txBody>
+      </p:sp>
+    </p:spTree>
+    <p:extLst>
+      <p:ext uri="{BB962C8B-B14F-4D97-AF65-F5344CB8AC3E}">
+        <p14:creationId xmlns:p14="http://schemas.microsoft.com/office/powerpoint/2010/main" val="2475940860"/>
+      </p:ext>
+    </p:extLst>
+  </p:cSld>
+  <p:clrMapOvr>
+    <a:masterClrMapping/>
+  </p:clrMapOvr>
+</p:sld>
+</file>
+
+<file path=ppt/slides/slide4.xml><?xml version="1.0" encoding="utf-8"?>
+<p:sld xmlns:a="http://schemas.openxmlformats.org/drawingml/2006/main" xmlns:r="http://schemas.openxmlformats.org/officeDocument/2006/relationships" xmlns:p="http://schemas.openxmlformats.org/presentationml/2006/main">
+  <p:cSld>
+    <p:spTree>
+      <p:nvGrpSpPr>
+        <p:cNvPr id="1" name=""/>
+        <p:cNvGrpSpPr/>
+        <p:nvPr/>
+      </p:nvGrpSpPr>
+      <p:grpSpPr>
+        <a:xfrm>
+          <a:off x="0" y="0"/>
+          <a:ext cx="0" cy="0"/>
+          <a:chOff x="0" y="0"/>
+          <a:chExt cx="0" cy="0"/>
+        </a:xfrm>
+      </p:grpSpPr>
+      <p:sp>
+        <p:nvSpPr>
+          <p:cNvPr id="2" name="Title 1">
+            <a:extLst>
+              <a:ext uri="{FF2B5EF4-FFF2-40B4-BE49-F238E27FC236}">
+                <a16:creationId xmlns:a16="http://schemas.microsoft.com/office/drawing/2014/main" id="{D327198A-0EBB-6EEE-A30C-5533FB41D77F}"/>
+              </a:ext>
+            </a:extLst>
+          </p:cNvPr>
+          <p:cNvSpPr>
+            <a:spLocks noGrp="1"/>
+          </p:cNvSpPr>
+          <p:nvPr>
+            <p:ph type="title"/>
+          </p:nvPr>
+        </p:nvSpPr>
+        <p:spPr/>
+        <p:txBody>
+          <a:bodyPr/>
+          <a:lstStyle/>
+          <a:p>
+            <a:r>
+              <a:rPr lang="en-US"/>
+              <a:t>L-MLT distributions</a:t>
+            </a:r>
+          </a:p>
+        </p:txBody>
+      </p:sp>
+      <p:sp>
+        <p:nvSpPr>
+          <p:cNvPr id="3" name="Content Placeholder 2">
+            <a:extLst>
+              <a:ext uri="{FF2B5EF4-FFF2-40B4-BE49-F238E27FC236}">
+                <a16:creationId xmlns:a16="http://schemas.microsoft.com/office/drawing/2014/main" id="{E7685D87-DD4E-C159-624A-7BF5B76E942A}"/>
+              </a:ext>
+            </a:extLst>
+          </p:cNvPr>
+          <p:cNvSpPr>
+            <a:spLocks noGrp="1"/>
+          </p:cNvSpPr>
+          <p:nvPr>
+            <p:ph idx="1"/>
+          </p:nvPr>
+        </p:nvSpPr>
+        <p:spPr/>
+        <p:txBody>
+          <a:bodyPr/>
+          <a:lstStyle/>
+          <a:p>
+            <a:endParaRPr lang="en-US"/>
+          </a:p>
+        </p:txBody>
+      </p:sp>
+      <p:sp>
+        <p:nvSpPr>
+          <p:cNvPr id="4" name="Date Placeholder 3">
+            <a:extLst>
+              <a:ext uri="{FF2B5EF4-FFF2-40B4-BE49-F238E27FC236}">
+                <a16:creationId xmlns:a16="http://schemas.microsoft.com/office/drawing/2014/main" id="{83E1DA83-1C25-DE1B-671A-58D2343D612E}"/>
+              </a:ext>
+            </a:extLst>
+          </p:cNvPr>
+          <p:cNvSpPr>
+            <a:spLocks noGrp="1"/>
+          </p:cNvSpPr>
+          <p:nvPr>
+            <p:ph type="dt" sz="half" idx="10"/>
+          </p:nvPr>
+        </p:nvSpPr>
+        <p:spPr/>
+        <p:txBody>
+          <a:bodyPr/>
+          <a:lstStyle/>
+          <a:p>
+            <a:fld id="{A9AE0B51-B8FF-42DE-A3A4-DF64D042A72E}" type="datetime1">
+              <a:rPr lang="en-US" smtClean="0"/>
+              <a:t>1/24/2023</a:t>
+            </a:fld>
+            <a:endParaRPr lang="en-US"/>
+          </a:p>
+        </p:txBody>
+      </p:sp>
+      <p:sp>
+        <p:nvSpPr>
+          <p:cNvPr id="5" name="Slide Number Placeholder 4">
+            <a:extLst>
+              <a:ext uri="{FF2B5EF4-FFF2-40B4-BE49-F238E27FC236}">
+                <a16:creationId xmlns:a16="http://schemas.microsoft.com/office/drawing/2014/main" id="{70515A79-E47A-AE6B-CFAE-7C921EB7DD41}"/>
+              </a:ext>
+            </a:extLst>
+          </p:cNvPr>
+          <p:cNvSpPr>
+            <a:spLocks noGrp="1"/>
+          </p:cNvSpPr>
+          <p:nvPr>
+            <p:ph type="sldNum" sz="quarter" idx="12"/>
+          </p:nvPr>
+        </p:nvSpPr>
+        <p:spPr/>
+        <p:txBody>
+          <a:bodyPr/>
+          <a:lstStyle/>
+          <a:p>
+            <a:fld id="{806C93F5-D892-47E2-990F-7040AF29FE32}" type="slidenum">
+              <a:rPr lang="en-US" smtClean="0"/>
+              <a:t>4</a:t>
+            </a:fld>
+            <a:endParaRPr lang="en-US"/>
+          </a:p>
+        </p:txBody>
+      </p:sp>
+    </p:spTree>
+    <p:extLst>
+      <p:ext uri="{BB962C8B-B14F-4D97-AF65-F5344CB8AC3E}">
+        <p14:creationId xmlns:p14="http://schemas.microsoft.com/office/powerpoint/2010/main" val="1485937462"/>
+      </p:ext>
+    </p:extLst>
+  </p:cSld>
+  <p:clrMapOvr>
+    <a:masterClrMapping/>
+  </p:clrMapOvr>
+</p:sld>
+</file>
+
+<file path=ppt/slides/slide5.xml><?xml version="1.0" encoding="utf-8"?>
+<p:sld xmlns:a="http://schemas.openxmlformats.org/drawingml/2006/main" xmlns:r="http://schemas.openxmlformats.org/officeDocument/2006/relationships" xmlns:p="http://schemas.openxmlformats.org/presentationml/2006/main">
+  <p:cSld>
+    <p:spTree>
+      <p:nvGrpSpPr>
+        <p:cNvPr id="1" name=""/>
+        <p:cNvGrpSpPr/>
+        <p:nvPr/>
+      </p:nvGrpSpPr>
+      <p:grpSpPr>
+        <a:xfrm>
+          <a:off x="0" y="0"/>
+          <a:ext cx="0" cy="0"/>
+          <a:chOff x="0" y="0"/>
+          <a:chExt cx="0" cy="0"/>
+        </a:xfrm>
+      </p:grpSpPr>
+      <p:sp>
+        <p:nvSpPr>
+          <p:cNvPr id="2" name="Title 1">
+            <a:extLst>
+              <a:ext uri="{FF2B5EF4-FFF2-40B4-BE49-F238E27FC236}">
+                <a16:creationId xmlns:a16="http://schemas.microsoft.com/office/drawing/2014/main" id="{4A50B4F5-C6C8-5D9E-DF28-218722F8E3F1}"/>
+              </a:ext>
+            </a:extLst>
+          </p:cNvPr>
+          <p:cNvSpPr>
+            <a:spLocks noGrp="1"/>
+          </p:cNvSpPr>
+          <p:nvPr>
+            <p:ph type="title"/>
+          </p:nvPr>
+        </p:nvSpPr>
+        <p:spPr/>
+        <p:txBody>
+          <a:bodyPr/>
+          <a:lstStyle/>
+          <a:p>
+            <a:r>
+              <a:rPr lang="en-US" dirty="0"/>
+              <a:t>Impressions &amp; Improvements</a:t>
+            </a:r>
+          </a:p>
+        </p:txBody>
+      </p:sp>
+      <p:sp>
+        <p:nvSpPr>
+          <p:cNvPr id="3" name="Content Placeholder 2">
+            <a:extLst>
+              <a:ext uri="{FF2B5EF4-FFF2-40B4-BE49-F238E27FC236}">
+                <a16:creationId xmlns:a16="http://schemas.microsoft.com/office/drawing/2014/main" id="{62C43083-E790-17CE-F497-035F51944162}"/>
+              </a:ext>
+            </a:extLst>
+          </p:cNvPr>
+          <p:cNvSpPr>
+            <a:spLocks noGrp="1"/>
+          </p:cNvSpPr>
+          <p:nvPr>
+            <p:ph idx="1"/>
+          </p:nvPr>
+        </p:nvSpPr>
+        <p:spPr/>
+        <p:txBody>
+          <a:bodyPr/>
+          <a:lstStyle/>
+          <a:p>
+            <a:r>
+              <a:rPr lang="en-US" dirty="0"/>
+              <a:t>Impressions</a:t>
+            </a:r>
+          </a:p>
+          <a:p>
+            <a:pPr lvl="1"/>
+            <a:r>
+              <a:rPr lang="en-US" dirty="0"/>
+              <a:t>The 200-500 keV durations look nice and surprisingly don’t change much in energy.</a:t>
+            </a:r>
+          </a:p>
+          <a:p>
+            <a:pPr lvl="1"/>
+            <a:r>
+              <a:rPr lang="en-US" dirty="0"/>
+              <a:t>The &gt; 1 MeV microburst durations should have been close to 100 </a:t>
+            </a:r>
+            <a:r>
+              <a:rPr lang="en-US" dirty="0" err="1"/>
+              <a:t>ms</a:t>
+            </a:r>
+            <a:r>
+              <a:rPr lang="en-US" dirty="0"/>
+              <a:t>, but the distribution looks wrong</a:t>
+            </a:r>
+          </a:p>
+          <a:p>
+            <a:r>
+              <a:rPr lang="en-US" dirty="0"/>
+              <a:t>Improvements</a:t>
+            </a:r>
+          </a:p>
+          <a:p>
+            <a:pPr lvl="1"/>
+            <a:r>
+              <a:rPr lang="en-US" dirty="0"/>
+              <a:t>Use my “number of 0’s” based saturation filter to remove bad events.</a:t>
+            </a:r>
+          </a:p>
+          <a:p>
+            <a:pPr lvl="1"/>
+            <a:r>
+              <a:rPr lang="en-US" dirty="0"/>
+              <a:t>Closely inspect the fits</a:t>
+            </a:r>
+          </a:p>
+          <a:p>
+            <a:pPr lvl="1"/>
+            <a:r>
+              <a:rPr lang="en-US" dirty="0"/>
+              <a:t>Try out different fit initial guesses such as initial </a:t>
+            </a:r>
+            <a:r>
+              <a:rPr lang="en-US" dirty="0" err="1"/>
+              <a:t>fwhm</a:t>
+            </a:r>
+            <a:endParaRPr lang="en-US" dirty="0"/>
+          </a:p>
+          <a:p>
+            <a:pPr lvl="1"/>
+            <a:r>
+              <a:rPr lang="en-US" dirty="0"/>
+              <a:t>Maybe could try this using the BARREL data?</a:t>
+            </a:r>
+          </a:p>
+        </p:txBody>
+      </p:sp>
+      <p:sp>
+        <p:nvSpPr>
+          <p:cNvPr id="4" name="Date Placeholder 3">
+            <a:extLst>
+              <a:ext uri="{FF2B5EF4-FFF2-40B4-BE49-F238E27FC236}">
+                <a16:creationId xmlns:a16="http://schemas.microsoft.com/office/drawing/2014/main" id="{3C41F324-C46E-A573-9F8F-52235659C096}"/>
+              </a:ext>
+            </a:extLst>
+          </p:cNvPr>
+          <p:cNvSpPr>
+            <a:spLocks noGrp="1"/>
+          </p:cNvSpPr>
+          <p:nvPr>
+            <p:ph type="dt" sz="half" idx="10"/>
+          </p:nvPr>
+        </p:nvSpPr>
+        <p:spPr/>
+        <p:txBody>
+          <a:bodyPr/>
+          <a:lstStyle/>
+          <a:p>
+            <a:fld id="{A9AE0B51-B8FF-42DE-A3A4-DF64D042A72E}" type="datetime1">
+              <a:rPr lang="en-US" smtClean="0"/>
+              <a:t>1/24/2023</a:t>
+            </a:fld>
+            <a:endParaRPr lang="en-US"/>
+          </a:p>
+        </p:txBody>
+      </p:sp>
+      <p:sp>
+        <p:nvSpPr>
+          <p:cNvPr id="5" name="Slide Number Placeholder 4">
+            <a:extLst>
+              <a:ext uri="{FF2B5EF4-FFF2-40B4-BE49-F238E27FC236}">
+                <a16:creationId xmlns:a16="http://schemas.microsoft.com/office/drawing/2014/main" id="{6F6B275A-D158-90A9-7766-1EA823B89C0B}"/>
+              </a:ext>
+            </a:extLst>
+          </p:cNvPr>
+          <p:cNvSpPr>
+            <a:spLocks noGrp="1"/>
+          </p:cNvSpPr>
+          <p:nvPr>
+            <p:ph type="sldNum" sz="quarter" idx="12"/>
+          </p:nvPr>
+        </p:nvSpPr>
+        <p:spPr/>
+        <p:txBody>
+          <a:bodyPr/>
+          <a:lstStyle/>
+          <a:p>
+            <a:fld id="{806C93F5-D892-47E2-990F-7040AF29FE32}" type="slidenum">
+              <a:rPr lang="en-US" smtClean="0"/>
+              <a:t>5</a:t>
+            </a:fld>
+            <a:endParaRPr lang="en-US"/>
+          </a:p>
+        </p:txBody>
+      </p:sp>
+    </p:spTree>
+    <p:extLst>
+      <p:ext uri="{BB962C8B-B14F-4D97-AF65-F5344CB8AC3E}">
+        <p14:creationId xmlns:p14="http://schemas.microsoft.com/office/powerpoint/2010/main" val="1626119085"/>
       </p:ext>
     </p:extLst>
   </p:cSld>

</xml_diff>